<commit_message>
Make some changes to DG, Add PPP
</commit_message>
<xml_diff>
--- a/docs/diagrams/RecentCommandSequenceDiagram.pptx
+++ b/docs/diagrams/RecentCommandSequenceDiagram.pptx
@@ -208,7 +208,7 @@
           <a:p>
             <a:fld id="{F5CC4B3F-88C1-4FFA-B1B6-F41C21DC6924}" type="datetimeFigureOut">
               <a:rPr lang="en-US" smtClean="0"/>
-              <a:t>3/23/2018</a:t>
+              <a:t>4/13/2018</a:t>
             </a:fld>
             <a:endParaRPr lang="en-US"/>
           </a:p>
@@ -738,7 +738,7 @@
           <a:p>
             <a:fld id="{78C97017-6FC3-485B-9764-EAC9E56C1D49}" type="datetimeFigureOut">
               <a:rPr lang="en-US" smtClean="0"/>
-              <a:t>3/23/2018</a:t>
+              <a:t>4/13/2018</a:t>
             </a:fld>
             <a:endParaRPr lang="en-US"/>
           </a:p>
@@ -906,7 +906,7 @@
           <a:p>
             <a:fld id="{78C97017-6FC3-485B-9764-EAC9E56C1D49}" type="datetimeFigureOut">
               <a:rPr lang="en-US" smtClean="0"/>
-              <a:t>3/23/2018</a:t>
+              <a:t>4/13/2018</a:t>
             </a:fld>
             <a:endParaRPr lang="en-US"/>
           </a:p>
@@ -1084,7 +1084,7 @@
           <a:p>
             <a:fld id="{78C97017-6FC3-485B-9764-EAC9E56C1D49}" type="datetimeFigureOut">
               <a:rPr lang="en-US" smtClean="0"/>
-              <a:t>3/23/2018</a:t>
+              <a:t>4/13/2018</a:t>
             </a:fld>
             <a:endParaRPr lang="en-US"/>
           </a:p>
@@ -1252,7 +1252,7 @@
           <a:p>
             <a:fld id="{78C97017-6FC3-485B-9764-EAC9E56C1D49}" type="datetimeFigureOut">
               <a:rPr lang="en-US" smtClean="0"/>
-              <a:t>3/23/2018</a:t>
+              <a:t>4/13/2018</a:t>
             </a:fld>
             <a:endParaRPr lang="en-US"/>
           </a:p>
@@ -1497,7 +1497,7 @@
           <a:p>
             <a:fld id="{78C97017-6FC3-485B-9764-EAC9E56C1D49}" type="datetimeFigureOut">
               <a:rPr lang="en-US" smtClean="0"/>
-              <a:t>3/23/2018</a:t>
+              <a:t>4/13/2018</a:t>
             </a:fld>
             <a:endParaRPr lang="en-US"/>
           </a:p>
@@ -1782,7 +1782,7 @@
           <a:p>
             <a:fld id="{78C97017-6FC3-485B-9764-EAC9E56C1D49}" type="datetimeFigureOut">
               <a:rPr lang="en-US" smtClean="0"/>
-              <a:t>3/23/2018</a:t>
+              <a:t>4/13/2018</a:t>
             </a:fld>
             <a:endParaRPr lang="en-US"/>
           </a:p>
@@ -2201,7 +2201,7 @@
           <a:p>
             <a:fld id="{78C97017-6FC3-485B-9764-EAC9E56C1D49}" type="datetimeFigureOut">
               <a:rPr lang="en-US" smtClean="0"/>
-              <a:t>3/23/2018</a:t>
+              <a:t>4/13/2018</a:t>
             </a:fld>
             <a:endParaRPr lang="en-US"/>
           </a:p>
@@ -2318,7 +2318,7 @@
           <a:p>
             <a:fld id="{78C97017-6FC3-485B-9764-EAC9E56C1D49}" type="datetimeFigureOut">
               <a:rPr lang="en-US" smtClean="0"/>
-              <a:t>3/23/2018</a:t>
+              <a:t>4/13/2018</a:t>
             </a:fld>
             <a:endParaRPr lang="en-US"/>
           </a:p>
@@ -2413,7 +2413,7 @@
           <a:p>
             <a:fld id="{78C97017-6FC3-485B-9764-EAC9E56C1D49}" type="datetimeFigureOut">
               <a:rPr lang="en-US" smtClean="0"/>
-              <a:t>3/23/2018</a:t>
+              <a:t>4/13/2018</a:t>
             </a:fld>
             <a:endParaRPr lang="en-US"/>
           </a:p>
@@ -2688,7 +2688,7 @@
           <a:p>
             <a:fld id="{78C97017-6FC3-485B-9764-EAC9E56C1D49}" type="datetimeFigureOut">
               <a:rPr lang="en-US" smtClean="0"/>
-              <a:t>3/23/2018</a:t>
+              <a:t>4/13/2018</a:t>
             </a:fld>
             <a:endParaRPr lang="en-US"/>
           </a:p>
@@ -2940,7 +2940,7 @@
           <a:p>
             <a:fld id="{78C97017-6FC3-485B-9764-EAC9E56C1D49}" type="datetimeFigureOut">
               <a:rPr lang="en-US" smtClean="0"/>
-              <a:t>3/23/2018</a:t>
+              <a:t>4/13/2018</a:t>
             </a:fld>
             <a:endParaRPr lang="en-US"/>
           </a:p>
@@ -3151,7 +3151,7 @@
           <a:p>
             <a:fld id="{78C97017-6FC3-485B-9764-EAC9E56C1D49}" type="datetimeFigureOut">
               <a:rPr lang="en-US" smtClean="0"/>
-              <a:t>3/23/2018</a:t>
+              <a:t>4/13/2018</a:t>
             </a:fld>
             <a:endParaRPr lang="en-US"/>
           </a:p>
@@ -3596,7 +3596,7 @@
         <p:spPr>
           <a:xfrm>
             <a:off x="1281982" y="971597"/>
-            <a:ext cx="9578" cy="2457403"/>
+            <a:ext cx="15717" cy="2550225"/>
           </a:xfrm>
           <a:prstGeom prst="line">
             <a:avLst/>
@@ -3633,7 +3633,7 @@
         <p:spPr>
           <a:xfrm>
             <a:off x="1209973" y="1322291"/>
-            <a:ext cx="163175" cy="1825968"/>
+            <a:ext cx="159213" cy="1927410"/>
           </a:xfrm>
           <a:prstGeom prst="rect">
             <a:avLst/>
@@ -3969,8 +3969,8 @@
         </p:nvCxnSpPr>
         <p:spPr>
           <a:xfrm flipH="1">
-            <a:off x="2954481" y="971597"/>
-            <a:ext cx="21161" cy="2362210"/>
+            <a:off x="2960735" y="971597"/>
+            <a:ext cx="14908" cy="2508408"/>
           </a:xfrm>
           <a:prstGeom prst="line">
             <a:avLst/>
@@ -4006,8 +4006,8 @@
         </p:nvSpPr>
         <p:spPr>
           <a:xfrm>
-            <a:off x="2887027" y="1426950"/>
-            <a:ext cx="134908" cy="1674099"/>
+            <a:off x="2887026" y="1426950"/>
+            <a:ext cx="142613" cy="1775453"/>
           </a:xfrm>
           <a:prstGeom prst="rect">
             <a:avLst/>
@@ -4061,7 +4061,7 @@
         <p:spPr>
           <a:xfrm flipV="1">
             <a:off x="466818" y="1322291"/>
-            <a:ext cx="824743" cy="3690"/>
+            <a:ext cx="822762" cy="3690"/>
           </a:xfrm>
           <a:prstGeom prst="straightConnector1">
             <a:avLst/>
@@ -4129,7 +4129,7 @@
         <p:spPr>
           <a:xfrm flipV="1">
             <a:off x="1348843" y="1426950"/>
-            <a:ext cx="1605638" cy="5192"/>
+            <a:ext cx="1609490" cy="5192"/>
           </a:xfrm>
           <a:prstGeom prst="straightConnector1">
             <a:avLst/>
@@ -4199,7 +4199,7 @@
         </p:nvCxnSpPr>
         <p:spPr>
           <a:xfrm>
-            <a:off x="3021935" y="2514600"/>
+            <a:off x="3021935" y="2331717"/>
             <a:ext cx="2796585" cy="0"/>
           </a:xfrm>
           <a:prstGeom prst="straightConnector1">
@@ -4232,13 +4232,12 @@
           <p:cNvPr id="35" name="Straight Arrow Connector 34"/>
           <p:cNvCxnSpPr>
             <a:cxnSpLocks/>
-            <a:endCxn id="18" idx="2"/>
           </p:cNvCxnSpPr>
           <p:nvPr/>
         </p:nvCxnSpPr>
         <p:spPr>
           <a:xfrm>
-            <a:off x="1399925" y="3101049"/>
+            <a:off x="1399925" y="3220059"/>
             <a:ext cx="1554556" cy="0"/>
           </a:xfrm>
           <a:prstGeom prst="straightConnector1">
@@ -4273,13 +4272,12 @@
           <p:cNvPr id="37" name="Straight Arrow Connector 36"/>
           <p:cNvCxnSpPr>
             <a:cxnSpLocks/>
-            <a:endCxn id="6" idx="2"/>
           </p:cNvCxnSpPr>
           <p:nvPr/>
         </p:nvCxnSpPr>
         <p:spPr>
           <a:xfrm>
-            <a:off x="303463" y="3143867"/>
+            <a:off x="303463" y="3262877"/>
             <a:ext cx="988098" cy="4392"/>
           </a:xfrm>
           <a:prstGeom prst="straightConnector1">
@@ -4317,7 +4315,7 @@
         </p:nvSpPr>
         <p:spPr>
           <a:xfrm>
-            <a:off x="6991335" y="601632"/>
+            <a:off x="7924800" y="601632"/>
             <a:ext cx="1371600" cy="346760"/>
           </a:xfrm>
           <a:prstGeom prst="rect">
@@ -4390,7 +4388,7 @@
         </p:nvCxnSpPr>
         <p:spPr>
           <a:xfrm>
-            <a:off x="7719508" y="914214"/>
+            <a:off x="8652973" y="914214"/>
             <a:ext cx="0" cy="2419593"/>
           </a:xfrm>
           <a:prstGeom prst="line">
@@ -4429,7 +4427,7 @@
         </p:nvCxnSpPr>
         <p:spPr>
           <a:xfrm>
-            <a:off x="7916995" y="4641993"/>
+            <a:off x="7086599" y="4641993"/>
             <a:ext cx="0" cy="1723059"/>
           </a:xfrm>
           <a:prstGeom prst="line">
@@ -4466,7 +4464,7 @@
         </p:nvSpPr>
         <p:spPr>
           <a:xfrm>
-            <a:off x="7844987" y="5335662"/>
+            <a:off x="7014591" y="5335662"/>
             <a:ext cx="124478" cy="287409"/>
           </a:xfrm>
           <a:prstGeom prst="rect">
@@ -4517,8 +4515,8 @@
         </p:nvSpPr>
         <p:spPr>
           <a:xfrm>
-            <a:off x="1510410" y="4797674"/>
-            <a:ext cx="3016320" cy="215444"/>
+            <a:off x="2209800" y="4797673"/>
+            <a:ext cx="2196085" cy="215444"/>
           </a:xfrm>
           <a:prstGeom prst="rect">
             <a:avLst/>
@@ -4549,7 +4547,7 @@
                   </a:schemeClr>
                 </a:solidFill>
               </a:rPr>
-              <a:t>SwitchToRecentBooksRequestEvent</a:t>
+              <a:t>ActiveListChangedEvent</a:t>
             </a:r>
             <a:r>
               <a:rPr lang="en-US" sz="1400" dirty="0">
@@ -4567,13 +4565,16 @@
       <p:cxnSp>
         <p:nvCxnSpPr>
           <p:cNvPr id="63" name="Straight Arrow Connector 62"/>
-          <p:cNvCxnSpPr/>
+          <p:cNvCxnSpPr>
+            <a:cxnSpLocks/>
+            <a:stCxn id="55" idx="2"/>
+          </p:cNvCxnSpPr>
           <p:nvPr/>
         </p:nvCxnSpPr>
         <p:spPr>
           <a:xfrm flipH="1">
-            <a:off x="4526729" y="5623071"/>
-            <a:ext cx="3383941" cy="0"/>
+            <a:off x="4526730" y="5623071"/>
+            <a:ext cx="2550100" cy="0"/>
           </a:xfrm>
           <a:prstGeom prst="straightConnector1">
             <a:avLst/>
@@ -4721,7 +4722,7 @@
         <p:spPr>
           <a:xfrm>
             <a:off x="4384723" y="5071220"/>
-            <a:ext cx="142006" cy="1036757"/>
+            <a:ext cx="132237" cy="714629"/>
           </a:xfrm>
           <a:prstGeom prst="rect">
             <a:avLst/>
@@ -4805,54 +4806,17 @@
       </p:cxnSp>
       <p:cxnSp>
         <p:nvCxnSpPr>
-          <p:cNvPr id="70" name="Straight Arrow Connector 69"/>
-          <p:cNvCxnSpPr/>
+          <p:cNvPr id="72" name="Straight Arrow Connector 71"/>
+          <p:cNvCxnSpPr>
+            <a:cxnSpLocks/>
+            <a:endCxn id="55" idx="0"/>
+          </p:cNvCxnSpPr>
           <p:nvPr/>
         </p:nvCxnSpPr>
         <p:spPr>
-          <a:xfrm>
-            <a:off x="2975642" y="6107977"/>
-            <a:ext cx="1448755" cy="0"/>
-          </a:xfrm>
-          <a:prstGeom prst="straightConnector1">
-            <a:avLst/>
-          </a:prstGeom>
-          <a:ln w="19050">
-            <a:solidFill>
-              <a:schemeClr val="accent5">
-                <a:lumMod val="75000"/>
-              </a:schemeClr>
-            </a:solidFill>
-            <a:prstDash val="sysDash"/>
-            <a:headEnd type="arrow" w="med" len="med"/>
-            <a:tailEnd type="none" w="med" len="med"/>
-          </a:ln>
-        </p:spPr>
-        <p:style>
-          <a:lnRef idx="1">
-            <a:schemeClr val="accent1"/>
-          </a:lnRef>
-          <a:fillRef idx="0">
-            <a:schemeClr val="accent1"/>
-          </a:fillRef>
-          <a:effectRef idx="0">
-            <a:schemeClr val="accent1"/>
-          </a:effectRef>
-          <a:fontRef idx="minor">
-            <a:schemeClr val="tx1"/>
-          </a:fontRef>
-        </p:style>
-      </p:cxnSp>
-      <p:cxnSp>
-        <p:nvCxnSpPr>
-          <p:cNvPr id="72" name="Straight Arrow Connector 71"/>
-          <p:cNvCxnSpPr/>
-          <p:nvPr/>
-        </p:nvCxnSpPr>
-        <p:spPr>
-          <a:xfrm>
-            <a:off x="4526729" y="5341014"/>
-            <a:ext cx="3318258" cy="0"/>
+          <a:xfrm flipV="1">
+            <a:off x="4526729" y="5335662"/>
+            <a:ext cx="2550101" cy="5352"/>
           </a:xfrm>
           <a:prstGeom prst="straightConnector1">
             <a:avLst/>
@@ -4910,7 +4874,7 @@
                   <a:srgbClr val="00B050"/>
                 </a:solidFill>
               </a:rPr>
-              <a:t>handleSwitchToRecentBooksRequestEvent</a:t>
+              <a:t>handleActiveListChangedEvent</a:t>
             </a:r>
             <a:r>
               <a:rPr lang="en-US" sz="1400" dirty="0">
@@ -4964,341 +4928,14 @@
       </p:cxnSp>
       <p:sp>
         <p:nvSpPr>
-          <p:cNvPr id="45" name="Rectangle 62"/>
-          <p:cNvSpPr/>
-          <p:nvPr/>
-        </p:nvSpPr>
-        <p:spPr>
-          <a:xfrm>
-            <a:off x="398758" y="4267200"/>
-            <a:ext cx="1430042" cy="346760"/>
-          </a:xfrm>
-          <a:prstGeom prst="rect">
-            <a:avLst/>
-          </a:prstGeom>
-          <a:solidFill>
-            <a:srgbClr val="0070C0"/>
-          </a:solidFill>
-          <a:ln w="19050">
-            <a:solidFill>
-              <a:srgbClr val="0070C0"/>
-            </a:solidFill>
-          </a:ln>
-          <a:effectLst/>
-        </p:spPr>
-        <p:style>
-          <a:lnRef idx="1">
-            <a:schemeClr val="accent2"/>
-          </a:lnRef>
-          <a:fillRef idx="2">
-            <a:schemeClr val="accent2"/>
-          </a:fillRef>
-          <a:effectRef idx="1">
-            <a:schemeClr val="accent2"/>
-          </a:effectRef>
-          <a:fontRef idx="minor">
-            <a:schemeClr val="dk1"/>
-          </a:fontRef>
-        </p:style>
-        <p:txBody>
-          <a:bodyPr rtlCol="0" anchor="ctr"/>
-          <a:lstStyle/>
-          <a:p>
-            <a:pPr algn="ctr"/>
-            <a:r>
-              <a:rPr lang="en-US" sz="1600" dirty="0">
-                <a:solidFill>
-                  <a:schemeClr val="bg1"/>
-                </a:solidFill>
-              </a:rPr>
-              <a:t>:</a:t>
-            </a:r>
-            <a:r>
-              <a:rPr lang="en-US" sz="1600" dirty="0" err="1">
-                <a:solidFill>
-                  <a:schemeClr val="bg1"/>
-                </a:solidFill>
-              </a:rPr>
-              <a:t>LogicManager</a:t>
-            </a:r>
-            <a:endParaRPr lang="en-SG" sz="1600" dirty="0">
-              <a:solidFill>
-                <a:schemeClr val="bg1"/>
-              </a:solidFill>
-            </a:endParaRPr>
-          </a:p>
-        </p:txBody>
-      </p:sp>
-      <p:cxnSp>
-        <p:nvCxnSpPr>
-          <p:cNvPr id="46" name="Straight Connector 45"/>
-          <p:cNvCxnSpPr/>
-          <p:nvPr/>
-        </p:nvCxnSpPr>
-        <p:spPr>
-          <a:xfrm>
-            <a:off x="1085672" y="4622655"/>
-            <a:ext cx="0" cy="1723059"/>
-          </a:xfrm>
-          <a:prstGeom prst="line">
-            <a:avLst/>
-          </a:prstGeom>
-          <a:ln w="19050">
-            <a:solidFill>
-              <a:srgbClr val="0070C0"/>
-            </a:solidFill>
-            <a:prstDash val="sysDash"/>
-          </a:ln>
-          <a:effectLst/>
-        </p:spPr>
-        <p:style>
-          <a:lnRef idx="1">
-            <a:schemeClr val="accent1"/>
-          </a:lnRef>
-          <a:fillRef idx="2">
-            <a:schemeClr val="accent1"/>
-          </a:fillRef>
-          <a:effectRef idx="1">
-            <a:schemeClr val="accent1"/>
-          </a:effectRef>
-          <a:fontRef idx="minor">
-            <a:schemeClr val="dk1"/>
-          </a:fontRef>
-        </p:style>
-      </p:cxnSp>
-      <p:sp>
-        <p:nvSpPr>
-          <p:cNvPr id="47" name="Rectangle 46"/>
-          <p:cNvSpPr/>
-          <p:nvPr/>
-        </p:nvSpPr>
-        <p:spPr>
-          <a:xfrm>
-            <a:off x="1013664" y="5651134"/>
-            <a:ext cx="130545" cy="273128"/>
-          </a:xfrm>
-          <a:prstGeom prst="rect">
-            <a:avLst/>
-          </a:prstGeom>
-          <a:solidFill>
-            <a:srgbClr val="0070C0"/>
-          </a:solidFill>
-          <a:ln>
-            <a:solidFill>
-              <a:srgbClr val="0070C0"/>
-            </a:solidFill>
-          </a:ln>
-          <a:effectLst/>
-        </p:spPr>
-        <p:style>
-          <a:lnRef idx="1">
-            <a:schemeClr val="accent3"/>
-          </a:lnRef>
-          <a:fillRef idx="2">
-            <a:schemeClr val="accent3"/>
-          </a:fillRef>
-          <a:effectRef idx="1">
-            <a:schemeClr val="accent3"/>
-          </a:effectRef>
-          <a:fontRef idx="minor">
-            <a:schemeClr val="dk1"/>
-          </a:fontRef>
-        </p:style>
-        <p:txBody>
-          <a:bodyPr rtlCol="0" anchor="ctr"/>
-          <a:lstStyle/>
-          <a:p>
-            <a:pPr algn="ctr"/>
-            <a:endParaRPr lang="en-SG" sz="1400">
-              <a:solidFill>
-                <a:schemeClr val="bg1"/>
-              </a:solidFill>
-            </a:endParaRPr>
-          </a:p>
-        </p:txBody>
-      </p:sp>
-      <p:cxnSp>
-        <p:nvCxnSpPr>
-          <p:cNvPr id="48" name="Straight Arrow Connector 47"/>
-          <p:cNvCxnSpPr>
-            <a:cxnSpLocks/>
-          </p:cNvCxnSpPr>
-          <p:nvPr/>
-        </p:nvCxnSpPr>
-        <p:spPr>
-          <a:xfrm flipH="1">
-            <a:off x="1209973" y="5943600"/>
-            <a:ext cx="3200712" cy="0"/>
-          </a:xfrm>
-          <a:prstGeom prst="straightConnector1">
-            <a:avLst/>
-          </a:prstGeom>
-          <a:ln w="19050">
-            <a:solidFill>
-              <a:srgbClr val="0070C0"/>
-            </a:solidFill>
-            <a:prstDash val="sysDash"/>
-            <a:headEnd type="arrow" w="med" len="med"/>
-            <a:tailEnd type="none" w="med" len="med"/>
-          </a:ln>
-        </p:spPr>
-        <p:style>
-          <a:lnRef idx="1">
-            <a:schemeClr val="accent1"/>
-          </a:lnRef>
-          <a:fillRef idx="0">
-            <a:schemeClr val="accent1"/>
-          </a:fillRef>
-          <a:effectRef idx="0">
-            <a:schemeClr val="accent1"/>
-          </a:effectRef>
-          <a:fontRef idx="minor">
-            <a:schemeClr val="tx1"/>
-          </a:fontRef>
-        </p:style>
-      </p:cxnSp>
-      <p:cxnSp>
-        <p:nvCxnSpPr>
-          <p:cNvPr id="49" name="Straight Arrow Connector 48"/>
-          <p:cNvCxnSpPr>
-            <a:cxnSpLocks/>
-          </p:cNvCxnSpPr>
-          <p:nvPr/>
-        </p:nvCxnSpPr>
-        <p:spPr>
-          <a:xfrm>
-            <a:off x="1166689" y="5670472"/>
-            <a:ext cx="3243995" cy="0"/>
-          </a:xfrm>
-          <a:prstGeom prst="straightConnector1">
-            <a:avLst/>
-          </a:prstGeom>
-          <a:ln w="19050">
-            <a:solidFill>
-              <a:schemeClr val="accent5">
-                <a:lumMod val="75000"/>
-              </a:schemeClr>
-            </a:solidFill>
-            <a:headEnd type="arrow" w="med" len="med"/>
-            <a:tailEnd type="none" w="med" len="med"/>
-          </a:ln>
-        </p:spPr>
-        <p:style>
-          <a:lnRef idx="1">
-            <a:schemeClr val="accent1"/>
-          </a:lnRef>
-          <a:fillRef idx="0">
-            <a:schemeClr val="accent1"/>
-          </a:fillRef>
-          <a:effectRef idx="0">
-            <a:schemeClr val="accent1"/>
-          </a:effectRef>
-          <a:fontRef idx="minor">
-            <a:schemeClr val="tx1"/>
-          </a:fontRef>
-        </p:style>
-      </p:cxnSp>
-      <p:sp>
-        <p:nvSpPr>
-          <p:cNvPr id="50" name="TextBox 49"/>
-          <p:cNvSpPr txBox="1"/>
-          <p:nvPr/>
-        </p:nvSpPr>
-        <p:spPr>
-          <a:xfrm>
-            <a:off x="1166689" y="5395369"/>
-            <a:ext cx="3224585" cy="215444"/>
-          </a:xfrm>
-          <a:prstGeom prst="rect">
-            <a:avLst/>
-          </a:prstGeom>
-          <a:noFill/>
-        </p:spPr>
-        <p:txBody>
-          <a:bodyPr wrap="square" lIns="0" tIns="0" rIns="0" bIns="0" rtlCol="0">
-            <a:spAutoFit/>
-          </a:bodyPr>
-          <a:lstStyle/>
-          <a:p>
-            <a:r>
-              <a:rPr lang="en-US" sz="1400" dirty="0" err="1">
-                <a:solidFill>
-                  <a:srgbClr val="0070C0"/>
-                </a:solidFill>
-              </a:rPr>
-              <a:t>handleSwitchToRecentBooksRequestEvent</a:t>
-            </a:r>
-            <a:r>
-              <a:rPr lang="en-US" sz="1400" dirty="0">
-                <a:solidFill>
-                  <a:srgbClr val="0070C0"/>
-                </a:solidFill>
-              </a:rPr>
-              <a:t>()</a:t>
-            </a:r>
-          </a:p>
-        </p:txBody>
-      </p:sp>
-      <p:sp>
-        <p:nvSpPr>
-          <p:cNvPr id="57" name="TextBox 56"/>
-          <p:cNvSpPr txBox="1"/>
-          <p:nvPr/>
-        </p:nvSpPr>
-        <p:spPr>
-          <a:xfrm>
-            <a:off x="-76189" y="5556423"/>
-            <a:ext cx="1040254" cy="430887"/>
-          </a:xfrm>
-          <a:prstGeom prst="rect">
-            <a:avLst/>
-          </a:prstGeom>
-          <a:noFill/>
-          <a:ln>
-            <a:noFill/>
-          </a:ln>
-        </p:spPr>
-        <p:txBody>
-          <a:bodyPr wrap="square" lIns="0" tIns="0" rIns="0" bIns="0" rtlCol="0">
-            <a:spAutoFit/>
-          </a:bodyPr>
-          <a:lstStyle/>
-          <a:p>
-            <a:pPr algn="r"/>
-            <a:r>
-              <a:rPr lang="en-US" sz="1400" dirty="0">
-                <a:solidFill>
-                  <a:srgbClr val="0070C0"/>
-                </a:solidFill>
-              </a:rPr>
-              <a:t>Update </a:t>
-            </a:r>
-            <a:r>
-              <a:rPr lang="en-US" sz="1400" dirty="0" err="1">
-                <a:solidFill>
-                  <a:srgbClr val="0070C0"/>
-                </a:solidFill>
-              </a:rPr>
-              <a:t>ActiveListType</a:t>
-            </a:r>
-            <a:endParaRPr lang="en-US" sz="1400" dirty="0">
-              <a:solidFill>
-                <a:srgbClr val="0070C0"/>
-              </a:solidFill>
-            </a:endParaRPr>
-          </a:p>
-        </p:txBody>
-      </p:sp>
-      <p:sp>
-        <p:nvSpPr>
           <p:cNvPr id="61" name="TextBox 60"/>
           <p:cNvSpPr txBox="1"/>
           <p:nvPr/>
         </p:nvSpPr>
         <p:spPr>
           <a:xfrm>
-            <a:off x="8009251" y="5239585"/>
-            <a:ext cx="1371594" cy="430887"/>
+            <a:off x="7178855" y="5239585"/>
+            <a:ext cx="1287150" cy="430887"/>
           </a:xfrm>
           <a:prstGeom prst="rect">
             <a:avLst/>
@@ -5319,13 +4956,15 @@
               </a:rPr>
               <a:t>Show </a:t>
             </a:r>
+          </a:p>
+          <a:p>
             <a:r>
               <a:rPr lang="en-US" sz="1400" dirty="0" err="1">
                 <a:solidFill>
                   <a:srgbClr val="00B050"/>
                 </a:solidFill>
               </a:rPr>
-              <a:t>RecentBooksPanel</a:t>
+              <a:t>RecentBooksList</a:t>
             </a:r>
             <a:endParaRPr lang="en-US" sz="1400" dirty="0">
               <a:solidFill>
@@ -5799,8 +5438,8 @@
         </p:nvCxnSpPr>
         <p:spPr>
           <a:xfrm flipH="1">
-            <a:off x="5924116" y="1740355"/>
-            <a:ext cx="19484" cy="1263531"/>
+            <a:off x="5935162" y="1740355"/>
+            <a:ext cx="8438" cy="1351069"/>
           </a:xfrm>
           <a:prstGeom prst="line">
             <a:avLst/>
@@ -6012,8 +5651,8 @@
         </p:nvSpPr>
         <p:spPr>
           <a:xfrm>
-            <a:off x="3226442" y="2288490"/>
-            <a:ext cx="1424846" cy="215444"/>
+            <a:off x="4810437" y="2116273"/>
+            <a:ext cx="709147" cy="215444"/>
           </a:xfrm>
           <a:prstGeom prst="rect">
             <a:avLst/>
@@ -6051,8 +5690,8 @@
         </p:nvSpPr>
         <p:spPr>
           <a:xfrm>
-            <a:off x="5838154" y="2491632"/>
-            <a:ext cx="171924" cy="512254"/>
+            <a:off x="5838153" y="2288490"/>
+            <a:ext cx="194018" cy="802934"/>
           </a:xfrm>
           <a:prstGeom prst="rect">
             <a:avLst/>
@@ -6109,9 +5748,9 @@
           <p:nvPr/>
         </p:nvCxnSpPr>
         <p:spPr>
-          <a:xfrm>
-            <a:off x="5846620" y="2601884"/>
-            <a:ext cx="1809579" cy="0"/>
+          <a:xfrm flipV="1">
+            <a:off x="6050225" y="2859693"/>
+            <a:ext cx="2539439" cy="15447"/>
           </a:xfrm>
           <a:prstGeom prst="straightConnector1">
             <a:avLst/>
@@ -6152,8 +5791,8 @@
         </p:nvSpPr>
         <p:spPr>
           <a:xfrm>
-            <a:off x="7656199" y="2559723"/>
-            <a:ext cx="138747" cy="346761"/>
+            <a:off x="8589664" y="2813174"/>
+            <a:ext cx="171924" cy="248624"/>
           </a:xfrm>
           <a:prstGeom prst="rect">
             <a:avLst/>
@@ -6215,8 +5854,8 @@
         </p:nvCxnSpPr>
         <p:spPr>
           <a:xfrm flipV="1">
-            <a:off x="6032177" y="2900182"/>
-            <a:ext cx="1624022" cy="6302"/>
+            <a:off x="6032177" y="3072765"/>
+            <a:ext cx="2570617" cy="10969"/>
           </a:xfrm>
           <a:prstGeom prst="straightConnector1">
             <a:avLst/>
@@ -6261,8 +5900,8 @@
         </p:nvSpPr>
         <p:spPr>
           <a:xfrm>
-            <a:off x="6053025" y="2123415"/>
-            <a:ext cx="1540641" cy="430887"/>
+            <a:off x="6201565" y="2590800"/>
+            <a:ext cx="2248672" cy="215444"/>
           </a:xfrm>
           <a:prstGeom prst="rect">
             <a:avLst/>
@@ -6293,7 +5932,7 @@
                   </a:schemeClr>
                 </a:solidFill>
               </a:rPr>
-              <a:t>SwitchToRecentBooksRequestEvent</a:t>
+              <a:t>ActiveListChangedEvent</a:t>
             </a:r>
             <a:r>
               <a:rPr lang="en-US" sz="1400" dirty="0">
@@ -6324,7 +5963,7 @@
         </p:nvCxnSpPr>
         <p:spPr>
           <a:xfrm>
-            <a:off x="3061746" y="2971800"/>
+            <a:off x="3061746" y="3090810"/>
             <a:ext cx="2751861" cy="0"/>
           </a:xfrm>
           <a:prstGeom prst="straightConnector1">
@@ -6368,7 +6007,7 @@
         </p:nvSpPr>
         <p:spPr>
           <a:xfrm>
-            <a:off x="7231196" y="4298381"/>
+            <a:off x="6400800" y="4298381"/>
             <a:ext cx="1371598" cy="346760"/>
           </a:xfrm>
           <a:prstGeom prst="rect">
@@ -6427,6 +6066,358 @@
           </a:p>
         </p:txBody>
       </p:sp>
+      <p:sp>
+        <p:nvSpPr>
+          <p:cNvPr id="84" name="Rectangle 62">
+            <a:extLst>
+              <a:ext uri="{FF2B5EF4-FFF2-40B4-BE49-F238E27FC236}">
+                <a16:creationId xmlns:a16="http://schemas.microsoft.com/office/drawing/2014/main" id="{EC6B20A3-E926-49A8-A371-7466B05DD421}"/>
+              </a:ext>
+            </a:extLst>
+          </p:cNvPr>
+          <p:cNvSpPr/>
+          <p:nvPr/>
+        </p:nvSpPr>
+        <p:spPr>
+          <a:xfrm>
+            <a:off x="6731578" y="599907"/>
+            <a:ext cx="1093635" cy="346760"/>
+          </a:xfrm>
+          <a:prstGeom prst="rect">
+            <a:avLst/>
+          </a:prstGeom>
+          <a:solidFill>
+            <a:srgbClr val="7030A0"/>
+          </a:solidFill>
+          <a:ln w="19050">
+            <a:solidFill>
+              <a:srgbClr val="7030A0"/>
+            </a:solidFill>
+          </a:ln>
+          <a:effectLst/>
+        </p:spPr>
+        <p:style>
+          <a:lnRef idx="1">
+            <a:schemeClr val="accent2"/>
+          </a:lnRef>
+          <a:fillRef idx="2">
+            <a:schemeClr val="accent2"/>
+          </a:fillRef>
+          <a:effectRef idx="1">
+            <a:schemeClr val="accent2"/>
+          </a:effectRef>
+          <a:fontRef idx="minor">
+            <a:schemeClr val="dk1"/>
+          </a:fontRef>
+        </p:style>
+        <p:txBody>
+          <a:bodyPr rtlCol="0" anchor="ctr"/>
+          <a:lstStyle/>
+          <a:p>
+            <a:pPr algn="ctr"/>
+            <a:r>
+              <a:rPr lang="en-US" sz="1600" dirty="0">
+                <a:solidFill>
+                  <a:schemeClr val="bg1"/>
+                </a:solidFill>
+              </a:rPr>
+              <a:t>:Model</a:t>
+            </a:r>
+            <a:endParaRPr lang="en-SG" sz="1600" dirty="0">
+              <a:solidFill>
+                <a:schemeClr val="bg1"/>
+              </a:solidFill>
+            </a:endParaRPr>
+          </a:p>
+        </p:txBody>
+      </p:sp>
+      <p:cxnSp>
+        <p:nvCxnSpPr>
+          <p:cNvPr id="86" name="Straight Connector 85">
+            <a:extLst>
+              <a:ext uri="{FF2B5EF4-FFF2-40B4-BE49-F238E27FC236}">
+                <a16:creationId xmlns:a16="http://schemas.microsoft.com/office/drawing/2014/main" id="{999024D8-EC0E-489D-8369-1F4BB57E539E}"/>
+              </a:ext>
+            </a:extLst>
+          </p:cNvPr>
+          <p:cNvCxnSpPr>
+            <a:cxnSpLocks/>
+          </p:cNvCxnSpPr>
+          <p:nvPr/>
+        </p:nvCxnSpPr>
+        <p:spPr>
+          <a:xfrm>
+            <a:off x="7278395" y="963578"/>
+            <a:ext cx="8798" cy="2370229"/>
+          </a:xfrm>
+          <a:prstGeom prst="line">
+            <a:avLst/>
+          </a:prstGeom>
+          <a:ln w="19050">
+            <a:solidFill>
+              <a:srgbClr val="7030A0"/>
+            </a:solidFill>
+            <a:prstDash val="sysDash"/>
+          </a:ln>
+          <a:effectLst/>
+        </p:spPr>
+        <p:style>
+          <a:lnRef idx="1">
+            <a:schemeClr val="accent1"/>
+          </a:lnRef>
+          <a:fillRef idx="2">
+            <a:schemeClr val="accent1"/>
+          </a:fillRef>
+          <a:effectRef idx="1">
+            <a:schemeClr val="accent1"/>
+          </a:effectRef>
+          <a:fontRef idx="minor">
+            <a:schemeClr val="dk1"/>
+          </a:fontRef>
+        </p:style>
+      </p:cxnSp>
+      <p:sp>
+        <p:nvSpPr>
+          <p:cNvPr id="87" name="Rectangle 86">
+            <a:extLst>
+              <a:ext uri="{FF2B5EF4-FFF2-40B4-BE49-F238E27FC236}">
+                <a16:creationId xmlns:a16="http://schemas.microsoft.com/office/drawing/2014/main" id="{0C349A19-7ECD-4E19-A0E5-2B63001A6CEB}"/>
+              </a:ext>
+            </a:extLst>
+          </p:cNvPr>
+          <p:cNvSpPr/>
+          <p:nvPr/>
+        </p:nvSpPr>
+        <p:spPr>
+          <a:xfrm>
+            <a:off x="7225993" y="2343538"/>
+            <a:ext cx="122400" cy="242109"/>
+          </a:xfrm>
+          <a:prstGeom prst="rect">
+            <a:avLst/>
+          </a:prstGeom>
+          <a:solidFill>
+            <a:srgbClr val="7030A0"/>
+          </a:solidFill>
+          <a:ln>
+            <a:solidFill>
+              <a:srgbClr val="7030A0"/>
+            </a:solidFill>
+          </a:ln>
+          <a:effectLst/>
+        </p:spPr>
+        <p:style>
+          <a:lnRef idx="1">
+            <a:schemeClr val="accent3"/>
+          </a:lnRef>
+          <a:fillRef idx="2">
+            <a:schemeClr val="accent3"/>
+          </a:fillRef>
+          <a:effectRef idx="1">
+            <a:schemeClr val="accent3"/>
+          </a:effectRef>
+          <a:fontRef idx="minor">
+            <a:schemeClr val="dk1"/>
+          </a:fontRef>
+        </p:style>
+        <p:txBody>
+          <a:bodyPr rtlCol="0" anchor="ctr"/>
+          <a:lstStyle/>
+          <a:p>
+            <a:pPr algn="ctr"/>
+            <a:endParaRPr lang="en-SG" sz="1400">
+              <a:solidFill>
+                <a:schemeClr val="dk1"/>
+              </a:solidFill>
+            </a:endParaRPr>
+          </a:p>
+        </p:txBody>
+      </p:sp>
+      <p:sp>
+        <p:nvSpPr>
+          <p:cNvPr id="88" name="TextBox 87">
+            <a:extLst>
+              <a:ext uri="{FF2B5EF4-FFF2-40B4-BE49-F238E27FC236}">
+                <a16:creationId xmlns:a16="http://schemas.microsoft.com/office/drawing/2014/main" id="{1C3689B7-8F1C-4207-A153-09F598D83858}"/>
+              </a:ext>
+            </a:extLst>
+          </p:cNvPr>
+          <p:cNvSpPr txBox="1"/>
+          <p:nvPr/>
+        </p:nvSpPr>
+        <p:spPr>
+          <a:xfrm>
+            <a:off x="6034219" y="1904926"/>
+            <a:ext cx="1289019" cy="430887"/>
+          </a:xfrm>
+          <a:prstGeom prst="rect">
+            <a:avLst/>
+          </a:prstGeom>
+          <a:noFill/>
+        </p:spPr>
+        <p:txBody>
+          <a:bodyPr wrap="square" lIns="0" tIns="0" rIns="0" bIns="0" rtlCol="0">
+            <a:spAutoFit/>
+          </a:bodyPr>
+          <a:lstStyle/>
+          <a:p>
+            <a:r>
+              <a:rPr lang="en-US" sz="1400" dirty="0" err="1">
+                <a:solidFill>
+                  <a:srgbClr val="7030A0"/>
+                </a:solidFill>
+              </a:rPr>
+              <a:t>setActiveListType</a:t>
+            </a:r>
+            <a:r>
+              <a:rPr lang="en-US" sz="1400" dirty="0">
+                <a:solidFill>
+                  <a:srgbClr val="7030A0"/>
+                </a:solidFill>
+              </a:rPr>
+              <a:t>(RECENT_BOOKS)</a:t>
+            </a:r>
+          </a:p>
+        </p:txBody>
+      </p:sp>
+      <p:cxnSp>
+        <p:nvCxnSpPr>
+          <p:cNvPr id="89" name="Straight Arrow Connector 88">
+            <a:extLst>
+              <a:ext uri="{FF2B5EF4-FFF2-40B4-BE49-F238E27FC236}">
+                <a16:creationId xmlns:a16="http://schemas.microsoft.com/office/drawing/2014/main" id="{11F3E302-DE83-4B11-9E9F-2AE30C0F8F5E}"/>
+              </a:ext>
+            </a:extLst>
+          </p:cNvPr>
+          <p:cNvCxnSpPr>
+            <a:cxnSpLocks/>
+          </p:cNvCxnSpPr>
+          <p:nvPr/>
+        </p:nvCxnSpPr>
+        <p:spPr>
+          <a:xfrm>
+            <a:off x="6049575" y="2585647"/>
+            <a:ext cx="1169270" cy="0"/>
+          </a:xfrm>
+          <a:prstGeom prst="straightConnector1">
+            <a:avLst/>
+          </a:prstGeom>
+          <a:ln w="19050">
+            <a:solidFill>
+              <a:srgbClr val="7030A0"/>
+            </a:solidFill>
+            <a:prstDash val="sysDash"/>
+            <a:headEnd type="arrow" w="med" len="med"/>
+            <a:tailEnd type="none" w="med" len="med"/>
+          </a:ln>
+        </p:spPr>
+        <p:style>
+          <a:lnRef idx="1">
+            <a:schemeClr val="accent1"/>
+          </a:lnRef>
+          <a:fillRef idx="0">
+            <a:schemeClr val="accent1"/>
+          </a:fillRef>
+          <a:effectRef idx="0">
+            <a:schemeClr val="accent1"/>
+          </a:effectRef>
+          <a:fontRef idx="minor">
+            <a:schemeClr val="tx1"/>
+          </a:fontRef>
+        </p:style>
+      </p:cxnSp>
+      <p:cxnSp>
+        <p:nvCxnSpPr>
+          <p:cNvPr id="90" name="Straight Arrow Connector 89">
+            <a:extLst>
+              <a:ext uri="{FF2B5EF4-FFF2-40B4-BE49-F238E27FC236}">
+                <a16:creationId xmlns:a16="http://schemas.microsoft.com/office/drawing/2014/main" id="{CAB360B0-82F5-44FB-8B86-DAF61B08854E}"/>
+              </a:ext>
+            </a:extLst>
+          </p:cNvPr>
+          <p:cNvCxnSpPr>
+            <a:cxnSpLocks/>
+          </p:cNvCxnSpPr>
+          <p:nvPr/>
+        </p:nvCxnSpPr>
+        <p:spPr>
+          <a:xfrm flipV="1">
+            <a:off x="6049575" y="2361263"/>
+            <a:ext cx="1169270" cy="9624"/>
+          </a:xfrm>
+          <a:prstGeom prst="straightConnector1">
+            <a:avLst/>
+          </a:prstGeom>
+          <a:ln w="19050">
+            <a:solidFill>
+              <a:srgbClr val="0070C0"/>
+            </a:solidFill>
+            <a:tailEnd type="arrow"/>
+          </a:ln>
+        </p:spPr>
+        <p:style>
+          <a:lnRef idx="1">
+            <a:schemeClr val="accent1"/>
+          </a:lnRef>
+          <a:fillRef idx="0">
+            <a:schemeClr val="accent1"/>
+          </a:fillRef>
+          <a:effectRef idx="0">
+            <a:schemeClr val="accent1"/>
+          </a:effectRef>
+          <a:fontRef idx="minor">
+            <a:schemeClr val="tx1"/>
+          </a:fontRef>
+        </p:style>
+      </p:cxnSp>
+      <p:cxnSp>
+        <p:nvCxnSpPr>
+          <p:cNvPr id="91" name="Straight Arrow Connector 90">
+            <a:extLst>
+              <a:ext uri="{FF2B5EF4-FFF2-40B4-BE49-F238E27FC236}">
+                <a16:creationId xmlns:a16="http://schemas.microsoft.com/office/drawing/2014/main" id="{1AD2AACC-F07E-4EDF-BC9D-211A211822D8}"/>
+              </a:ext>
+            </a:extLst>
+          </p:cNvPr>
+          <p:cNvCxnSpPr>
+            <a:cxnSpLocks/>
+          </p:cNvCxnSpPr>
+          <p:nvPr/>
+        </p:nvCxnSpPr>
+        <p:spPr>
+          <a:xfrm flipH="1">
+            <a:off x="3239469" y="5791200"/>
+            <a:ext cx="1180131" cy="0"/>
+          </a:xfrm>
+          <a:prstGeom prst="straightConnector1">
+            <a:avLst/>
+          </a:prstGeom>
+          <a:ln w="19050">
+            <a:solidFill>
+              <a:schemeClr val="accent5">
+                <a:lumMod val="75000"/>
+              </a:schemeClr>
+            </a:solidFill>
+            <a:prstDash val="sysDash"/>
+            <a:headEnd type="none" w="med" len="med"/>
+            <a:tailEnd type="arrow" w="med" len="med"/>
+          </a:ln>
+        </p:spPr>
+        <p:style>
+          <a:lnRef idx="1">
+            <a:schemeClr val="accent1"/>
+          </a:lnRef>
+          <a:fillRef idx="0">
+            <a:schemeClr val="accent1"/>
+          </a:fillRef>
+          <a:effectRef idx="0">
+            <a:schemeClr val="accent1"/>
+          </a:effectRef>
+          <a:fontRef idx="minor">
+            <a:schemeClr val="tx1"/>
+          </a:fontRef>
+        </p:style>
+      </p:cxnSp>
     </p:spTree>
     <p:extLst>
       <p:ext uri="{BB962C8B-B14F-4D97-AF65-F5344CB8AC3E}">

</xml_diff>